<commit_message>
added architechture to ppt
</commit_message>
<xml_diff>
--- a/07.PHP/3.Databse/Intro to Database.pptx
+++ b/07.PHP/3.Databse/Intro to Database.pptx
@@ -9,6 +9,12 @@
     <p:sldId id="257" r:id="rId3"/>
     <p:sldId id="258" r:id="rId4"/>
     <p:sldId id="259" r:id="rId5"/>
+    <p:sldId id="260" r:id="rId6"/>
+    <p:sldId id="261" r:id="rId7"/>
+    <p:sldId id="262" r:id="rId8"/>
+    <p:sldId id="263" r:id="rId9"/>
+    <p:sldId id="264" r:id="rId10"/>
+    <p:sldId id="265" r:id="rId11"/>
   </p:sldIdLst>
   <p:sldSz cx="9144000" cy="6858000" type="screen4x3"/>
   <p:notesSz cx="6858000" cy="9144000"/>
@@ -107,6 +113,22 @@
       </a:defRPr>
     </a:lvl9pPr>
   </p:defaultTextStyle>
+  <p:extLst>
+    <p:ext uri="{EFAFB233-063F-42B5-8137-9DF3F51BA10A}">
+      <p15:sldGuideLst xmlns:p15="http://schemas.microsoft.com/office/powerpoint/2012/main">
+        <p15:guide id="1" orient="horz" pos="2160">
+          <p15:clr>
+            <a:srgbClr val="A4A3A4"/>
+          </p15:clr>
+        </p15:guide>
+        <p15:guide id="2" pos="2880">
+          <p15:clr>
+            <a:srgbClr val="A4A3A4"/>
+          </p15:clr>
+        </p15:guide>
+      </p15:sldGuideLst>
+    </p:ext>
+  </p:extLst>
 </p:presentation>
 </file>
 
@@ -678,10 +700,9 @@
           </a:lstStyle>
           <a:p>
             <a:r>
-              <a:rPr kumimoji="0" lang="en-US" smtClean="0"/>
+              <a:rPr kumimoji="0" lang="en-US"/>
               <a:t>Click to edit Master title style</a:t>
             </a:r>
-            <a:endParaRPr kumimoji="0" lang="en-US"/>
           </a:p>
         </p:txBody>
       </p:sp>
@@ -739,10 +760,9 @@
           </a:lstStyle>
           <a:p>
             <a:r>
-              <a:rPr kumimoji="0" lang="en-US" smtClean="0"/>
+              <a:rPr kumimoji="0" lang="en-US"/>
               <a:t>Click to edit Master subtitle style</a:t>
             </a:r>
-            <a:endParaRPr kumimoji="0" lang="en-US"/>
           </a:p>
         </p:txBody>
       </p:sp>
@@ -769,7 +789,7 @@
             <a:fld id="{1D8BD707-D9CF-40AE-B4C6-C98DA3205C09}" type="datetimeFigureOut">
               <a:rPr lang="en-US" smtClean="0"/>
               <a:pPr/>
-              <a:t>4/17/2021</a:t>
+              <a:t>4/21/2021</a:t>
             </a:fld>
             <a:endParaRPr lang="en-US"/>
           </a:p>
@@ -877,10 +897,9 @@
           <a:lstStyle/>
           <a:p>
             <a:r>
-              <a:rPr kumimoji="0" lang="en-US" smtClean="0"/>
+              <a:rPr kumimoji="0" lang="en-US"/>
               <a:t>Click to edit Master title style</a:t>
             </a:r>
-            <a:endParaRPr kumimoji="0" lang="en-US"/>
           </a:p>
         </p:txBody>
       </p:sp>
@@ -901,35 +920,35 @@
           <a:p>
             <a:pPr lvl="0" eaLnBrk="1" latinLnBrk="0" hangingPunct="1"/>
             <a:r>
-              <a:rPr lang="en-US" smtClean="0"/>
+              <a:rPr lang="en-US"/>
               <a:t>Click to edit Master text styles</a:t>
             </a:r>
           </a:p>
           <a:p>
             <a:pPr lvl="1" eaLnBrk="1" latinLnBrk="0" hangingPunct="1"/>
             <a:r>
-              <a:rPr lang="en-US" smtClean="0"/>
+              <a:rPr lang="en-US"/>
               <a:t>Second level</a:t>
             </a:r>
           </a:p>
           <a:p>
             <a:pPr lvl="2" eaLnBrk="1" latinLnBrk="0" hangingPunct="1"/>
             <a:r>
-              <a:rPr lang="en-US" smtClean="0"/>
+              <a:rPr lang="en-US"/>
               <a:t>Third level</a:t>
             </a:r>
           </a:p>
           <a:p>
             <a:pPr lvl="3" eaLnBrk="1" latinLnBrk="0" hangingPunct="1"/>
             <a:r>
-              <a:rPr lang="en-US" smtClean="0"/>
+              <a:rPr lang="en-US"/>
               <a:t>Fourth level</a:t>
             </a:r>
           </a:p>
           <a:p>
             <a:pPr lvl="4" eaLnBrk="1" latinLnBrk="0" hangingPunct="1"/>
             <a:r>
-              <a:rPr lang="en-US" smtClean="0"/>
+              <a:rPr lang="en-US"/>
               <a:t>Fifth level</a:t>
             </a:r>
             <a:endParaRPr kumimoji="0" lang="en-US"/>
@@ -954,7 +973,7 @@
             <a:fld id="{1D8BD707-D9CF-40AE-B4C6-C98DA3205C09}" type="datetimeFigureOut">
               <a:rPr lang="en-US" smtClean="0"/>
               <a:pPr/>
-              <a:t>4/17/2021</a:t>
+              <a:t>4/21/2021</a:t>
             </a:fld>
             <a:endParaRPr lang="en-US"/>
           </a:p>
@@ -1049,10 +1068,9 @@
           <a:lstStyle/>
           <a:p>
             <a:r>
-              <a:rPr kumimoji="0" lang="en-US" smtClean="0"/>
+              <a:rPr kumimoji="0" lang="en-US"/>
               <a:t>Click to edit Master title style</a:t>
             </a:r>
-            <a:endParaRPr kumimoji="0" lang="en-US"/>
           </a:p>
         </p:txBody>
       </p:sp>
@@ -1078,35 +1096,35 @@
           <a:p>
             <a:pPr lvl="0" eaLnBrk="1" latinLnBrk="0" hangingPunct="1"/>
             <a:r>
-              <a:rPr lang="en-US" smtClean="0"/>
+              <a:rPr lang="en-US"/>
               <a:t>Click to edit Master text styles</a:t>
             </a:r>
           </a:p>
           <a:p>
             <a:pPr lvl="1" eaLnBrk="1" latinLnBrk="0" hangingPunct="1"/>
             <a:r>
-              <a:rPr lang="en-US" smtClean="0"/>
+              <a:rPr lang="en-US"/>
               <a:t>Second level</a:t>
             </a:r>
           </a:p>
           <a:p>
             <a:pPr lvl="2" eaLnBrk="1" latinLnBrk="0" hangingPunct="1"/>
             <a:r>
-              <a:rPr lang="en-US" smtClean="0"/>
+              <a:rPr lang="en-US"/>
               <a:t>Third level</a:t>
             </a:r>
           </a:p>
           <a:p>
             <a:pPr lvl="3" eaLnBrk="1" latinLnBrk="0" hangingPunct="1"/>
             <a:r>
-              <a:rPr lang="en-US" smtClean="0"/>
+              <a:rPr lang="en-US"/>
               <a:t>Fourth level</a:t>
             </a:r>
           </a:p>
           <a:p>
             <a:pPr lvl="4" eaLnBrk="1" latinLnBrk="0" hangingPunct="1"/>
             <a:r>
-              <a:rPr lang="en-US" smtClean="0"/>
+              <a:rPr lang="en-US"/>
               <a:t>Fifth level</a:t>
             </a:r>
             <a:endParaRPr kumimoji="0" lang="en-US"/>
@@ -1131,7 +1149,7 @@
             <a:fld id="{1D8BD707-D9CF-40AE-B4C6-C98DA3205C09}" type="datetimeFigureOut">
               <a:rPr lang="en-US" smtClean="0"/>
               <a:pPr/>
-              <a:t>4/17/2021</a:t>
+              <a:t>4/21/2021</a:t>
             </a:fld>
             <a:endParaRPr lang="en-US"/>
           </a:p>
@@ -1221,10 +1239,9 @@
           <a:lstStyle/>
           <a:p>
             <a:r>
-              <a:rPr kumimoji="0" lang="en-US" smtClean="0"/>
+              <a:rPr kumimoji="0" lang="en-US"/>
               <a:t>Click to edit Master title style</a:t>
             </a:r>
-            <a:endParaRPr kumimoji="0" lang="en-US"/>
           </a:p>
         </p:txBody>
       </p:sp>
@@ -1245,35 +1262,35 @@
           <a:p>
             <a:pPr lvl="0" eaLnBrk="1" latinLnBrk="0" hangingPunct="1"/>
             <a:r>
-              <a:rPr lang="en-US" smtClean="0"/>
+              <a:rPr lang="en-US"/>
               <a:t>Click to edit Master text styles</a:t>
             </a:r>
           </a:p>
           <a:p>
             <a:pPr lvl="1" eaLnBrk="1" latinLnBrk="0" hangingPunct="1"/>
             <a:r>
-              <a:rPr lang="en-US" smtClean="0"/>
+              <a:rPr lang="en-US"/>
               <a:t>Second level</a:t>
             </a:r>
           </a:p>
           <a:p>
             <a:pPr lvl="2" eaLnBrk="1" latinLnBrk="0" hangingPunct="1"/>
             <a:r>
-              <a:rPr lang="en-US" smtClean="0"/>
+              <a:rPr lang="en-US"/>
               <a:t>Third level</a:t>
             </a:r>
           </a:p>
           <a:p>
             <a:pPr lvl="3" eaLnBrk="1" latinLnBrk="0" hangingPunct="1"/>
             <a:r>
-              <a:rPr lang="en-US" smtClean="0"/>
+              <a:rPr lang="en-US"/>
               <a:t>Fourth level</a:t>
             </a:r>
           </a:p>
           <a:p>
             <a:pPr lvl="4" eaLnBrk="1" latinLnBrk="0" hangingPunct="1"/>
             <a:r>
-              <a:rPr lang="en-US" smtClean="0"/>
+              <a:rPr lang="en-US"/>
               <a:t>Fifth level</a:t>
             </a:r>
             <a:endParaRPr kumimoji="0" lang="en-US"/>
@@ -1298,7 +1315,7 @@
             <a:fld id="{1D8BD707-D9CF-40AE-B4C6-C98DA3205C09}" type="datetimeFigureOut">
               <a:rPr lang="en-US" smtClean="0"/>
               <a:pPr/>
-              <a:t>4/17/2021</a:t>
+              <a:t>4/21/2021</a:t>
             </a:fld>
             <a:endParaRPr lang="en-US"/>
           </a:p>
@@ -1419,10 +1436,9 @@
           </a:lstStyle>
           <a:p>
             <a:r>
-              <a:rPr kumimoji="0" lang="en-US" smtClean="0"/>
+              <a:rPr kumimoji="0" lang="en-US"/>
               <a:t>Click to edit Master title style</a:t>
             </a:r>
-            <a:endParaRPr kumimoji="0" lang="en-US"/>
           </a:p>
         </p:txBody>
       </p:sp>
@@ -1497,7 +1513,7 @@
           <a:p>
             <a:pPr lvl="0" eaLnBrk="1" latinLnBrk="0" hangingPunct="1"/>
             <a:r>
-              <a:rPr kumimoji="0" lang="en-US" smtClean="0"/>
+              <a:rPr kumimoji="0" lang="en-US"/>
               <a:t>Click to edit Master text styles</a:t>
             </a:r>
           </a:p>
@@ -1521,7 +1537,7 @@
             <a:fld id="{1D8BD707-D9CF-40AE-B4C6-C98DA3205C09}" type="datetimeFigureOut">
               <a:rPr lang="en-US" smtClean="0"/>
               <a:pPr/>
-              <a:t>4/17/2021</a:t>
+              <a:t>4/21/2021</a:t>
             </a:fld>
             <a:endParaRPr lang="en-US"/>
           </a:p>
@@ -1611,10 +1627,9 @@
           <a:lstStyle/>
           <a:p>
             <a:r>
-              <a:rPr kumimoji="0" lang="en-US" smtClean="0"/>
+              <a:rPr kumimoji="0" lang="en-US"/>
               <a:t>Click to edit Master title style</a:t>
             </a:r>
-            <a:endParaRPr kumimoji="0" lang="en-US"/>
           </a:p>
         </p:txBody>
       </p:sp>
@@ -1656,35 +1671,35 @@
           <a:p>
             <a:pPr lvl="0" eaLnBrk="1" latinLnBrk="0" hangingPunct="1"/>
             <a:r>
-              <a:rPr lang="en-US" smtClean="0"/>
+              <a:rPr lang="en-US"/>
               <a:t>Click to edit Master text styles</a:t>
             </a:r>
           </a:p>
           <a:p>
             <a:pPr lvl="1" eaLnBrk="1" latinLnBrk="0" hangingPunct="1"/>
             <a:r>
-              <a:rPr lang="en-US" smtClean="0"/>
+              <a:rPr lang="en-US"/>
               <a:t>Second level</a:t>
             </a:r>
           </a:p>
           <a:p>
             <a:pPr lvl="2" eaLnBrk="1" latinLnBrk="0" hangingPunct="1"/>
             <a:r>
-              <a:rPr lang="en-US" smtClean="0"/>
+              <a:rPr lang="en-US"/>
               <a:t>Third level</a:t>
             </a:r>
           </a:p>
           <a:p>
             <a:pPr lvl="3" eaLnBrk="1" latinLnBrk="0" hangingPunct="1"/>
             <a:r>
-              <a:rPr lang="en-US" smtClean="0"/>
+              <a:rPr lang="en-US"/>
               <a:t>Fourth level</a:t>
             </a:r>
           </a:p>
           <a:p>
             <a:pPr lvl="4" eaLnBrk="1" latinLnBrk="0" hangingPunct="1"/>
             <a:r>
-              <a:rPr lang="en-US" smtClean="0"/>
+              <a:rPr lang="en-US"/>
               <a:t>Fifth level</a:t>
             </a:r>
             <a:endParaRPr kumimoji="0" lang="en-US"/>
@@ -1729,35 +1744,35 @@
           <a:p>
             <a:pPr lvl="0" eaLnBrk="1" latinLnBrk="0" hangingPunct="1"/>
             <a:r>
-              <a:rPr lang="en-US" smtClean="0"/>
+              <a:rPr lang="en-US"/>
               <a:t>Click to edit Master text styles</a:t>
             </a:r>
           </a:p>
           <a:p>
             <a:pPr lvl="1" eaLnBrk="1" latinLnBrk="0" hangingPunct="1"/>
             <a:r>
-              <a:rPr lang="en-US" smtClean="0"/>
+              <a:rPr lang="en-US"/>
               <a:t>Second level</a:t>
             </a:r>
           </a:p>
           <a:p>
             <a:pPr lvl="2" eaLnBrk="1" latinLnBrk="0" hangingPunct="1"/>
             <a:r>
-              <a:rPr lang="en-US" smtClean="0"/>
+              <a:rPr lang="en-US"/>
               <a:t>Third level</a:t>
             </a:r>
           </a:p>
           <a:p>
             <a:pPr lvl="3" eaLnBrk="1" latinLnBrk="0" hangingPunct="1"/>
             <a:r>
-              <a:rPr lang="en-US" smtClean="0"/>
+              <a:rPr lang="en-US"/>
               <a:t>Fourth level</a:t>
             </a:r>
           </a:p>
           <a:p>
             <a:pPr lvl="4" eaLnBrk="1" latinLnBrk="0" hangingPunct="1"/>
             <a:r>
-              <a:rPr lang="en-US" smtClean="0"/>
+              <a:rPr lang="en-US"/>
               <a:t>Fifth level</a:t>
             </a:r>
             <a:endParaRPr kumimoji="0" lang="en-US"/>
@@ -1782,7 +1797,7 @@
             <a:fld id="{1D8BD707-D9CF-40AE-B4C6-C98DA3205C09}" type="datetimeFigureOut">
               <a:rPr lang="en-US" smtClean="0"/>
               <a:pPr/>
-              <a:t>4/17/2021</a:t>
+              <a:t>4/21/2021</a:t>
             </a:fld>
             <a:endParaRPr lang="en-US"/>
           </a:p>
@@ -1881,10 +1896,9 @@
           </a:lstStyle>
           <a:p>
             <a:r>
-              <a:rPr kumimoji="0" lang="en-US" smtClean="0"/>
+              <a:rPr kumimoji="0" lang="en-US"/>
               <a:t>Click to edit Master title style</a:t>
             </a:r>
-            <a:endParaRPr kumimoji="0" lang="en-US"/>
           </a:p>
         </p:txBody>
       </p:sp>
@@ -1950,7 +1964,7 @@
           <a:p>
             <a:pPr lvl="0" eaLnBrk="1" latinLnBrk="0" hangingPunct="1"/>
             <a:r>
-              <a:rPr kumimoji="0" lang="en-US" smtClean="0"/>
+              <a:rPr kumimoji="0" lang="en-US"/>
               <a:t>Click to edit Master text styles</a:t>
             </a:r>
           </a:p>
@@ -2018,7 +2032,7 @@
           <a:p>
             <a:pPr lvl="0" eaLnBrk="1" latinLnBrk="0" hangingPunct="1"/>
             <a:r>
-              <a:rPr kumimoji="0" lang="en-US" smtClean="0"/>
+              <a:rPr kumimoji="0" lang="en-US"/>
               <a:t>Click to edit Master text styles</a:t>
             </a:r>
           </a:p>
@@ -2062,35 +2076,35 @@
           <a:p>
             <a:pPr lvl="0" eaLnBrk="1" latinLnBrk="0" hangingPunct="1"/>
             <a:r>
-              <a:rPr lang="en-US" smtClean="0"/>
+              <a:rPr lang="en-US"/>
               <a:t>Click to edit Master text styles</a:t>
             </a:r>
           </a:p>
           <a:p>
             <a:pPr lvl="1" eaLnBrk="1" latinLnBrk="0" hangingPunct="1"/>
             <a:r>
-              <a:rPr lang="en-US" smtClean="0"/>
+              <a:rPr lang="en-US"/>
               <a:t>Second level</a:t>
             </a:r>
           </a:p>
           <a:p>
             <a:pPr lvl="2" eaLnBrk="1" latinLnBrk="0" hangingPunct="1"/>
             <a:r>
-              <a:rPr lang="en-US" smtClean="0"/>
+              <a:rPr lang="en-US"/>
               <a:t>Third level</a:t>
             </a:r>
           </a:p>
           <a:p>
             <a:pPr lvl="3" eaLnBrk="1" latinLnBrk="0" hangingPunct="1"/>
             <a:r>
-              <a:rPr lang="en-US" smtClean="0"/>
+              <a:rPr lang="en-US"/>
               <a:t>Fourth level</a:t>
             </a:r>
           </a:p>
           <a:p>
             <a:pPr lvl="4" eaLnBrk="1" latinLnBrk="0" hangingPunct="1"/>
             <a:r>
-              <a:rPr lang="en-US" smtClean="0"/>
+              <a:rPr lang="en-US"/>
               <a:t>Fifth level</a:t>
             </a:r>
             <a:endParaRPr kumimoji="0" lang="en-US"/>
@@ -2135,35 +2149,35 @@
           <a:p>
             <a:pPr lvl="0" eaLnBrk="1" latinLnBrk="0" hangingPunct="1"/>
             <a:r>
-              <a:rPr lang="en-US" smtClean="0"/>
+              <a:rPr lang="en-US"/>
               <a:t>Click to edit Master text styles</a:t>
             </a:r>
           </a:p>
           <a:p>
             <a:pPr lvl="1" eaLnBrk="1" latinLnBrk="0" hangingPunct="1"/>
             <a:r>
-              <a:rPr lang="en-US" smtClean="0"/>
+              <a:rPr lang="en-US"/>
               <a:t>Second level</a:t>
             </a:r>
           </a:p>
           <a:p>
             <a:pPr lvl="2" eaLnBrk="1" latinLnBrk="0" hangingPunct="1"/>
             <a:r>
-              <a:rPr lang="en-US" smtClean="0"/>
+              <a:rPr lang="en-US"/>
               <a:t>Third level</a:t>
             </a:r>
           </a:p>
           <a:p>
             <a:pPr lvl="3" eaLnBrk="1" latinLnBrk="0" hangingPunct="1"/>
             <a:r>
-              <a:rPr lang="en-US" smtClean="0"/>
+              <a:rPr lang="en-US"/>
               <a:t>Fourth level</a:t>
             </a:r>
           </a:p>
           <a:p>
             <a:pPr lvl="4" eaLnBrk="1" latinLnBrk="0" hangingPunct="1"/>
             <a:r>
-              <a:rPr lang="en-US" smtClean="0"/>
+              <a:rPr lang="en-US"/>
               <a:t>Fifth level</a:t>
             </a:r>
             <a:endParaRPr kumimoji="0" lang="en-US"/>
@@ -2188,7 +2202,7 @@
             <a:fld id="{1D8BD707-D9CF-40AE-B4C6-C98DA3205C09}" type="datetimeFigureOut">
               <a:rPr lang="en-US" smtClean="0"/>
               <a:pPr/>
-              <a:t>4/17/2021</a:t>
+              <a:t>4/21/2021</a:t>
             </a:fld>
             <a:endParaRPr lang="en-US"/>
           </a:p>
@@ -2291,10 +2305,9 @@
           </a:lstStyle>
           <a:p>
             <a:r>
-              <a:rPr kumimoji="0" lang="en-US" smtClean="0"/>
+              <a:rPr kumimoji="0" lang="en-US"/>
               <a:t>Click to edit Master title style</a:t>
             </a:r>
-            <a:endParaRPr kumimoji="0" lang="en-US"/>
           </a:p>
         </p:txBody>
       </p:sp>
@@ -2321,7 +2334,7 @@
             <a:fld id="{1D8BD707-D9CF-40AE-B4C6-C98DA3205C09}" type="datetimeFigureOut">
               <a:rPr lang="en-US" smtClean="0"/>
               <a:pPr/>
-              <a:t>4/17/2021</a:t>
+              <a:t>4/21/2021</a:t>
             </a:fld>
             <a:endParaRPr lang="en-US"/>
           </a:p>
@@ -2423,7 +2436,7 @@
             <a:fld id="{1D8BD707-D9CF-40AE-B4C6-C98DA3205C09}" type="datetimeFigureOut">
               <a:rPr lang="en-US" smtClean="0"/>
               <a:pPr/>
-              <a:t>4/17/2021</a:t>
+              <a:t>4/21/2021</a:t>
             </a:fld>
             <a:endParaRPr lang="en-US"/>
           </a:p>
@@ -2523,10 +2536,9 @@
           </a:lstStyle>
           <a:p>
             <a:r>
-              <a:rPr kumimoji="0" lang="en-US" smtClean="0"/>
+              <a:rPr kumimoji="0" lang="en-US"/>
               <a:t>Click to edit Master title style</a:t>
             </a:r>
-            <a:endParaRPr kumimoji="0" lang="en-US"/>
           </a:p>
         </p:txBody>
       </p:sp>
@@ -2573,7 +2585,7 @@
           <a:p>
             <a:pPr lvl="0" eaLnBrk="1" latinLnBrk="0" hangingPunct="1"/>
             <a:r>
-              <a:rPr kumimoji="0" lang="en-US" smtClean="0"/>
+              <a:rPr kumimoji="0" lang="en-US"/>
               <a:t>Click to edit Master text styles</a:t>
             </a:r>
           </a:p>
@@ -2617,35 +2629,35 @@
           <a:p>
             <a:pPr lvl="0" eaLnBrk="1" latinLnBrk="0" hangingPunct="1"/>
             <a:r>
-              <a:rPr lang="en-US" smtClean="0"/>
+              <a:rPr lang="en-US"/>
               <a:t>Click to edit Master text styles</a:t>
             </a:r>
           </a:p>
           <a:p>
             <a:pPr lvl="1" eaLnBrk="1" latinLnBrk="0" hangingPunct="1"/>
             <a:r>
-              <a:rPr lang="en-US" smtClean="0"/>
+              <a:rPr lang="en-US"/>
               <a:t>Second level</a:t>
             </a:r>
           </a:p>
           <a:p>
             <a:pPr lvl="2" eaLnBrk="1" latinLnBrk="0" hangingPunct="1"/>
             <a:r>
-              <a:rPr lang="en-US" smtClean="0"/>
+              <a:rPr lang="en-US"/>
               <a:t>Third level</a:t>
             </a:r>
           </a:p>
           <a:p>
             <a:pPr lvl="3" eaLnBrk="1" latinLnBrk="0" hangingPunct="1"/>
             <a:r>
-              <a:rPr lang="en-US" smtClean="0"/>
+              <a:rPr lang="en-US"/>
               <a:t>Fourth level</a:t>
             </a:r>
           </a:p>
           <a:p>
             <a:pPr lvl="4" eaLnBrk="1" latinLnBrk="0" hangingPunct="1"/>
             <a:r>
-              <a:rPr lang="en-US" smtClean="0"/>
+              <a:rPr lang="en-US"/>
               <a:t>Fifth level</a:t>
             </a:r>
             <a:endParaRPr kumimoji="0" lang="en-US"/>
@@ -2670,7 +2682,7 @@
             <a:fld id="{1D8BD707-D9CF-40AE-B4C6-C98DA3205C09}" type="datetimeFigureOut">
               <a:rPr lang="en-US" smtClean="0"/>
               <a:pPr/>
-              <a:t>4/17/2021</a:t>
+              <a:t>4/21/2021</a:t>
             </a:fld>
             <a:endParaRPr lang="en-US"/>
           </a:p>
@@ -2770,10 +2782,9 @@
           </a:lstStyle>
           <a:p>
             <a:r>
-              <a:rPr kumimoji="0" lang="en-US" smtClean="0"/>
+              <a:rPr kumimoji="0" lang="en-US"/>
               <a:t>Click to edit Master title style</a:t>
             </a:r>
-            <a:endParaRPr kumimoji="0" lang="en-US"/>
           </a:p>
         </p:txBody>
       </p:sp>
@@ -2831,7 +2842,7 @@
           </a:lstStyle>
           <a:p>
             <a:r>
-              <a:rPr kumimoji="0" lang="en-US" smtClean="0"/>
+              <a:rPr kumimoji="0" lang="en-US"/>
               <a:t>Click icon to add picture</a:t>
             </a:r>
             <a:endParaRPr kumimoji="0" lang="en-US" dirty="0"/>
@@ -2892,7 +2903,7 @@
           <a:p>
             <a:pPr lvl="0" eaLnBrk="1" latinLnBrk="0" hangingPunct="1"/>
             <a:r>
-              <a:rPr kumimoji="0" lang="en-US" smtClean="0"/>
+              <a:rPr kumimoji="0" lang="en-US"/>
               <a:t>Click to edit Master text styles</a:t>
             </a:r>
           </a:p>
@@ -2916,7 +2927,7 @@
             <a:fld id="{1D8BD707-D9CF-40AE-B4C6-C98DA3205C09}" type="datetimeFigureOut">
               <a:rPr lang="en-US" smtClean="0"/>
               <a:pPr/>
-              <a:t>4/17/2021</a:t>
+              <a:t>4/21/2021</a:t>
             </a:fld>
             <a:endParaRPr lang="en-US"/>
           </a:p>
@@ -3639,10 +3650,9 @@
           <a:lstStyle/>
           <a:p>
             <a:r>
-              <a:rPr kumimoji="0" lang="en-US" smtClean="0"/>
+              <a:rPr kumimoji="0" lang="en-US"/>
               <a:t>Click to edit Master title style</a:t>
             </a:r>
-            <a:endParaRPr kumimoji="0" lang="en-US"/>
           </a:p>
         </p:txBody>
       </p:sp>
@@ -3673,38 +3683,37 @@
           <a:p>
             <a:pPr lvl="0" eaLnBrk="1" latinLnBrk="0" hangingPunct="1"/>
             <a:r>
-              <a:rPr kumimoji="0" lang="en-US" smtClean="0"/>
+              <a:rPr kumimoji="0" lang="en-US"/>
               <a:t>Click to edit Master text styles</a:t>
             </a:r>
           </a:p>
           <a:p>
             <a:pPr lvl="1" eaLnBrk="1" latinLnBrk="0" hangingPunct="1"/>
             <a:r>
-              <a:rPr kumimoji="0" lang="en-US" smtClean="0"/>
+              <a:rPr kumimoji="0" lang="en-US"/>
               <a:t>Second level</a:t>
             </a:r>
           </a:p>
           <a:p>
             <a:pPr lvl="2" eaLnBrk="1" latinLnBrk="0" hangingPunct="1"/>
             <a:r>
-              <a:rPr kumimoji="0" lang="en-US" smtClean="0"/>
+              <a:rPr kumimoji="0" lang="en-US"/>
               <a:t>Third level</a:t>
             </a:r>
           </a:p>
           <a:p>
             <a:pPr lvl="3" eaLnBrk="1" latinLnBrk="0" hangingPunct="1"/>
             <a:r>
-              <a:rPr kumimoji="0" lang="en-US" smtClean="0"/>
+              <a:rPr kumimoji="0" lang="en-US"/>
               <a:t>Fourth level</a:t>
             </a:r>
           </a:p>
           <a:p>
             <a:pPr lvl="4" eaLnBrk="1" latinLnBrk="0" hangingPunct="1"/>
             <a:r>
-              <a:rPr kumimoji="0" lang="en-US" smtClean="0"/>
+              <a:rPr kumimoji="0" lang="en-US"/>
               <a:t>Fifth level</a:t>
             </a:r>
-            <a:endParaRPr kumimoji="0" lang="en-US"/>
           </a:p>
         </p:txBody>
       </p:sp>
@@ -3742,7 +3751,7 @@
             <a:fld id="{1D8BD707-D9CF-40AE-B4C6-C98DA3205C09}" type="datetimeFigureOut">
               <a:rPr lang="en-US" smtClean="0"/>
               <a:pPr/>
-              <a:t>4/17/2021</a:t>
+              <a:t>4/21/2021</a:t>
             </a:fld>
             <a:endParaRPr lang="en-US"/>
           </a:p>
@@ -4149,10 +4158,9 @@
           <a:lstStyle/>
           <a:p>
             <a:r>
-              <a:rPr lang="en-US" dirty="0" smtClean="0"/>
+              <a:rPr lang="en-US" dirty="0"/>
               <a:t>Introduction to Database</a:t>
             </a:r>
-            <a:endParaRPr lang="en-US" dirty="0"/>
           </a:p>
         </p:txBody>
       </p:sp>
@@ -4176,6 +4184,96 @@
         </p:txBody>
       </p:sp>
     </p:spTree>
+  </p:cSld>
+  <p:clrMapOvr>
+    <a:masterClrMapping/>
+  </p:clrMapOvr>
+</p:sld>
+</file>
+
+<file path=ppt/slides/slide10.xml><?xml version="1.0" encoding="utf-8"?>
+<p:sld xmlns:a="http://schemas.openxmlformats.org/drawingml/2006/main" xmlns:r="http://schemas.openxmlformats.org/officeDocument/2006/relationships" xmlns:p="http://schemas.openxmlformats.org/presentationml/2006/main">
+  <p:cSld>
+    <p:spTree>
+      <p:nvGrpSpPr>
+        <p:cNvPr id="1" name=""/>
+        <p:cNvGrpSpPr/>
+        <p:nvPr/>
+      </p:nvGrpSpPr>
+      <p:grpSpPr>
+        <a:xfrm>
+          <a:off x="0" y="0"/>
+          <a:ext cx="0" cy="0"/>
+          <a:chOff x="0" y="0"/>
+          <a:chExt cx="0" cy="0"/>
+        </a:xfrm>
+      </p:grpSpPr>
+      <p:sp>
+        <p:nvSpPr>
+          <p:cNvPr id="2" name="Title 1">
+            <a:extLst>
+              <a:ext uri="{FF2B5EF4-FFF2-40B4-BE49-F238E27FC236}">
+                <a16:creationId xmlns:a16="http://schemas.microsoft.com/office/drawing/2014/main" id="{1F08908C-84BB-4E0F-92A9-C60A12D7011F}"/>
+              </a:ext>
+            </a:extLst>
+          </p:cNvPr>
+          <p:cNvSpPr>
+            <a:spLocks noGrp="1"/>
+          </p:cNvSpPr>
+          <p:nvPr>
+            <p:ph type="title"/>
+          </p:nvPr>
+        </p:nvSpPr>
+        <p:spPr/>
+        <p:txBody>
+          <a:bodyPr/>
+          <a:lstStyle/>
+          <a:p>
+            <a:endParaRPr lang="en-US"/>
+          </a:p>
+        </p:txBody>
+      </p:sp>
+      <p:pic>
+        <p:nvPicPr>
+          <p:cNvPr id="5" name="Content Placeholder 4" descr="Diagram&#10;&#10;Description automatically generated">
+            <a:extLst>
+              <a:ext uri="{FF2B5EF4-FFF2-40B4-BE49-F238E27FC236}">
+                <a16:creationId xmlns:a16="http://schemas.microsoft.com/office/drawing/2014/main" id="{43EFA86E-1B92-44C1-AB74-89A5C87F90A9}"/>
+              </a:ext>
+            </a:extLst>
+          </p:cNvPr>
+          <p:cNvPicPr>
+            <a:picLocks noGrp="1" noChangeAspect="1"/>
+          </p:cNvPicPr>
+          <p:nvPr>
+            <p:ph idx="1"/>
+          </p:nvPr>
+        </p:nvPicPr>
+        <p:blipFill>
+          <a:blip r:embed="rId2">
+            <a:extLst>
+              <a:ext uri="{28A0092B-C50C-407E-A947-70E740481C1C}">
+                <a14:useLocalDpi xmlns:a14="http://schemas.microsoft.com/office/drawing/2010/main" val="0"/>
+              </a:ext>
+            </a:extLst>
+          </a:blip>
+          <a:stretch>
+            <a:fillRect/>
+          </a:stretch>
+        </p:blipFill>
+        <p:spPr>
+          <a:xfrm>
+            <a:off x="152400" y="-6096"/>
+            <a:ext cx="8839200" cy="7031994"/>
+          </a:xfrm>
+        </p:spPr>
+      </p:pic>
+    </p:spTree>
+    <p:extLst>
+      <p:ext uri="{BB962C8B-B14F-4D97-AF65-F5344CB8AC3E}">
+        <p14:creationId xmlns:p14="http://schemas.microsoft.com/office/powerpoint/2010/main" val="1132695514"/>
+      </p:ext>
+    </p:extLst>
   </p:cSld>
   <p:clrMapOvr>
     <a:masterClrMapping/>
@@ -4394,18 +4492,17 @@
           <a:lstStyle/>
           <a:p>
             <a:r>
-              <a:rPr lang="en-US" dirty="0" smtClean="0"/>
+              <a:rPr lang="en-US" dirty="0"/>
               <a:t>SQL </a:t>
             </a:r>
             <a:r>
-              <a:rPr lang="en-US" dirty="0" err="1" smtClean="0"/>
+              <a:rPr lang="en-US" dirty="0" err="1"/>
               <a:t>vs</a:t>
             </a:r>
             <a:r>
-              <a:rPr lang="en-US" dirty="0" smtClean="0"/>
+              <a:rPr lang="en-US" dirty="0"/>
               <a:t> NOSQL</a:t>
             </a:r>
-            <a:endParaRPr lang="en-US" dirty="0"/>
           </a:p>
         </p:txBody>
       </p:sp>
@@ -4455,6 +4552,475 @@
         </p:spPr>
       </p:pic>
     </p:spTree>
+  </p:cSld>
+  <p:clrMapOvr>
+    <a:masterClrMapping/>
+  </p:clrMapOvr>
+</p:sld>
+</file>
+
+<file path=ppt/slides/slide5.xml><?xml version="1.0" encoding="utf-8"?>
+<p:sld xmlns:a="http://schemas.openxmlformats.org/drawingml/2006/main" xmlns:r="http://schemas.openxmlformats.org/officeDocument/2006/relationships" xmlns:p="http://schemas.openxmlformats.org/presentationml/2006/main">
+  <p:cSld>
+    <p:spTree>
+      <p:nvGrpSpPr>
+        <p:cNvPr id="1" name=""/>
+        <p:cNvGrpSpPr/>
+        <p:nvPr/>
+      </p:nvGrpSpPr>
+      <p:grpSpPr>
+        <a:xfrm>
+          <a:off x="0" y="0"/>
+          <a:ext cx="0" cy="0"/>
+          <a:chOff x="0" y="0"/>
+          <a:chExt cx="0" cy="0"/>
+        </a:xfrm>
+      </p:grpSpPr>
+      <p:sp>
+        <p:nvSpPr>
+          <p:cNvPr id="2" name="Title 1">
+            <a:extLst>
+              <a:ext uri="{FF2B5EF4-FFF2-40B4-BE49-F238E27FC236}">
+                <a16:creationId xmlns:a16="http://schemas.microsoft.com/office/drawing/2014/main" id="{3C7121A1-A109-47DA-9BF9-BAF35260F87D}"/>
+              </a:ext>
+            </a:extLst>
+          </p:cNvPr>
+          <p:cNvSpPr>
+            <a:spLocks noGrp="1"/>
+          </p:cNvSpPr>
+          <p:nvPr>
+            <p:ph type="title"/>
+          </p:nvPr>
+        </p:nvSpPr>
+        <p:spPr/>
+        <p:txBody>
+          <a:bodyPr/>
+          <a:lstStyle/>
+          <a:p>
+            <a:r>
+              <a:rPr lang="en-US" dirty="0"/>
+              <a:t>Database architecture </a:t>
+            </a:r>
+          </a:p>
+        </p:txBody>
+      </p:sp>
+      <p:sp>
+        <p:nvSpPr>
+          <p:cNvPr id="3" name="Content Placeholder 2">
+            <a:extLst>
+              <a:ext uri="{FF2B5EF4-FFF2-40B4-BE49-F238E27FC236}">
+                <a16:creationId xmlns:a16="http://schemas.microsoft.com/office/drawing/2014/main" id="{ADD51C83-BFB9-4542-AD77-1F419CD86A64}"/>
+              </a:ext>
+            </a:extLst>
+          </p:cNvPr>
+          <p:cNvSpPr>
+            <a:spLocks noGrp="1"/>
+          </p:cNvSpPr>
+          <p:nvPr>
+            <p:ph idx="1"/>
+          </p:nvPr>
+        </p:nvSpPr>
+        <p:spPr/>
+        <p:txBody>
+          <a:bodyPr/>
+          <a:lstStyle/>
+          <a:p>
+            <a:r>
+              <a:rPr lang="en-US" dirty="0"/>
+              <a:t>2-level architecture</a:t>
+            </a:r>
+          </a:p>
+          <a:p>
+            <a:r>
+              <a:rPr lang="en-US" dirty="0"/>
+              <a:t>3-level architecture </a:t>
+            </a:r>
+          </a:p>
+        </p:txBody>
+      </p:sp>
+    </p:spTree>
+    <p:extLst>
+      <p:ext uri="{BB962C8B-B14F-4D97-AF65-F5344CB8AC3E}">
+        <p14:creationId xmlns:p14="http://schemas.microsoft.com/office/powerpoint/2010/main" val="2821055264"/>
+      </p:ext>
+    </p:extLst>
+  </p:cSld>
+  <p:clrMapOvr>
+    <a:masterClrMapping/>
+  </p:clrMapOvr>
+</p:sld>
+</file>
+
+<file path=ppt/slides/slide6.xml><?xml version="1.0" encoding="utf-8"?>
+<p:sld xmlns:a="http://schemas.openxmlformats.org/drawingml/2006/main" xmlns:r="http://schemas.openxmlformats.org/officeDocument/2006/relationships" xmlns:p="http://schemas.openxmlformats.org/presentationml/2006/main">
+  <p:cSld>
+    <p:spTree>
+      <p:nvGrpSpPr>
+        <p:cNvPr id="1" name=""/>
+        <p:cNvGrpSpPr/>
+        <p:nvPr/>
+      </p:nvGrpSpPr>
+      <p:grpSpPr>
+        <a:xfrm>
+          <a:off x="0" y="0"/>
+          <a:ext cx="0" cy="0"/>
+          <a:chOff x="0" y="0"/>
+          <a:chExt cx="0" cy="0"/>
+        </a:xfrm>
+      </p:grpSpPr>
+      <p:sp>
+        <p:nvSpPr>
+          <p:cNvPr id="2" name="Title 1">
+            <a:extLst>
+              <a:ext uri="{FF2B5EF4-FFF2-40B4-BE49-F238E27FC236}">
+                <a16:creationId xmlns:a16="http://schemas.microsoft.com/office/drawing/2014/main" id="{51BF11EA-79EB-4E63-9801-C7E81FF612B3}"/>
+              </a:ext>
+            </a:extLst>
+          </p:cNvPr>
+          <p:cNvSpPr>
+            <a:spLocks noGrp="1"/>
+          </p:cNvSpPr>
+          <p:nvPr>
+            <p:ph type="title"/>
+          </p:nvPr>
+        </p:nvSpPr>
+        <p:spPr/>
+        <p:txBody>
+          <a:bodyPr/>
+          <a:lstStyle/>
+          <a:p>
+            <a:r>
+              <a:rPr lang="en-US" dirty="0"/>
+              <a:t>Two tier </a:t>
+            </a:r>
+            <a:r>
+              <a:rPr lang="en-US" b="1" dirty="0"/>
+              <a:t>architecture</a:t>
+            </a:r>
+            <a:r>
+              <a:rPr lang="en-US" dirty="0"/>
+              <a:t>:</a:t>
+            </a:r>
+          </a:p>
+        </p:txBody>
+      </p:sp>
+      <p:pic>
+        <p:nvPicPr>
+          <p:cNvPr id="5" name="Content Placeholder 4" descr="Diagram&#10;&#10;Description automatically generated">
+            <a:extLst>
+              <a:ext uri="{FF2B5EF4-FFF2-40B4-BE49-F238E27FC236}">
+                <a16:creationId xmlns:a16="http://schemas.microsoft.com/office/drawing/2014/main" id="{FF2BAD21-60EE-40E5-83DD-124EEA163F70}"/>
+              </a:ext>
+            </a:extLst>
+          </p:cNvPr>
+          <p:cNvPicPr>
+            <a:picLocks noGrp="1" noChangeAspect="1"/>
+          </p:cNvPicPr>
+          <p:nvPr>
+            <p:ph idx="1"/>
+          </p:nvPr>
+        </p:nvPicPr>
+        <p:blipFill>
+          <a:blip r:embed="rId2">
+            <a:extLst>
+              <a:ext uri="{28A0092B-C50C-407E-A947-70E740481C1C}">
+                <a14:useLocalDpi xmlns:a14="http://schemas.microsoft.com/office/drawing/2010/main" val="0"/>
+              </a:ext>
+            </a:extLst>
+          </a:blip>
+          <a:stretch>
+            <a:fillRect/>
+          </a:stretch>
+        </p:blipFill>
+        <p:spPr>
+          <a:xfrm>
+            <a:off x="3033712" y="3063875"/>
+            <a:ext cx="3076575" cy="2695575"/>
+          </a:xfrm>
+        </p:spPr>
+      </p:pic>
+    </p:spTree>
+    <p:extLst>
+      <p:ext uri="{BB962C8B-B14F-4D97-AF65-F5344CB8AC3E}">
+        <p14:creationId xmlns:p14="http://schemas.microsoft.com/office/powerpoint/2010/main" val="3046388094"/>
+      </p:ext>
+    </p:extLst>
+  </p:cSld>
+  <p:clrMapOvr>
+    <a:masterClrMapping/>
+  </p:clrMapOvr>
+</p:sld>
+</file>
+
+<file path=ppt/slides/slide7.xml><?xml version="1.0" encoding="utf-8"?>
+<p:sld xmlns:a="http://schemas.openxmlformats.org/drawingml/2006/main" xmlns:r="http://schemas.openxmlformats.org/officeDocument/2006/relationships" xmlns:p="http://schemas.openxmlformats.org/presentationml/2006/main">
+  <p:cSld>
+    <p:spTree>
+      <p:nvGrpSpPr>
+        <p:cNvPr id="1" name=""/>
+        <p:cNvGrpSpPr/>
+        <p:nvPr/>
+      </p:nvGrpSpPr>
+      <p:grpSpPr>
+        <a:xfrm>
+          <a:off x="0" y="0"/>
+          <a:ext cx="0" cy="0"/>
+          <a:chOff x="0" y="0"/>
+          <a:chExt cx="0" cy="0"/>
+        </a:xfrm>
+      </p:grpSpPr>
+      <p:sp>
+        <p:nvSpPr>
+          <p:cNvPr id="2" name="Title 1">
+            <a:extLst>
+              <a:ext uri="{FF2B5EF4-FFF2-40B4-BE49-F238E27FC236}">
+                <a16:creationId xmlns:a16="http://schemas.microsoft.com/office/drawing/2014/main" id="{BE79B1EC-DF86-4F9A-93C5-256A747A8E9B}"/>
+              </a:ext>
+            </a:extLst>
+          </p:cNvPr>
+          <p:cNvSpPr>
+            <a:spLocks noGrp="1"/>
+          </p:cNvSpPr>
+          <p:nvPr>
+            <p:ph type="title"/>
+          </p:nvPr>
+        </p:nvSpPr>
+        <p:spPr/>
+        <p:txBody>
+          <a:bodyPr/>
+          <a:lstStyle/>
+          <a:p>
+            <a:r>
+              <a:rPr lang="en-US" dirty="0"/>
+              <a:t>Three level architecture </a:t>
+            </a:r>
+          </a:p>
+        </p:txBody>
+      </p:sp>
+      <p:pic>
+        <p:nvPicPr>
+          <p:cNvPr id="5" name="Content Placeholder 4" descr="Diagram&#10;&#10;Description automatically generated">
+            <a:extLst>
+              <a:ext uri="{FF2B5EF4-FFF2-40B4-BE49-F238E27FC236}">
+                <a16:creationId xmlns:a16="http://schemas.microsoft.com/office/drawing/2014/main" id="{D92622AC-DED1-4E7E-8399-A787585CD8FC}"/>
+              </a:ext>
+            </a:extLst>
+          </p:cNvPr>
+          <p:cNvPicPr>
+            <a:picLocks noGrp="1" noChangeAspect="1"/>
+          </p:cNvPicPr>
+          <p:nvPr>
+            <p:ph idx="1"/>
+          </p:nvPr>
+        </p:nvPicPr>
+        <p:blipFill>
+          <a:blip r:embed="rId2">
+            <a:extLst>
+              <a:ext uri="{28A0092B-C50C-407E-A947-70E740481C1C}">
+                <a14:useLocalDpi xmlns:a14="http://schemas.microsoft.com/office/drawing/2010/main" val="0"/>
+              </a:ext>
+            </a:extLst>
+          </a:blip>
+          <a:stretch>
+            <a:fillRect/>
+          </a:stretch>
+        </p:blipFill>
+        <p:spPr>
+          <a:xfrm>
+            <a:off x="2690812" y="2430463"/>
+            <a:ext cx="3762375" cy="3962400"/>
+          </a:xfrm>
+        </p:spPr>
+      </p:pic>
+    </p:spTree>
+    <p:extLst>
+      <p:ext uri="{BB962C8B-B14F-4D97-AF65-F5344CB8AC3E}">
+        <p14:creationId xmlns:p14="http://schemas.microsoft.com/office/powerpoint/2010/main" val="1627281440"/>
+      </p:ext>
+    </p:extLst>
+  </p:cSld>
+  <p:clrMapOvr>
+    <a:masterClrMapping/>
+  </p:clrMapOvr>
+</p:sld>
+</file>
+
+<file path=ppt/slides/slide8.xml><?xml version="1.0" encoding="utf-8"?>
+<p:sld xmlns:a="http://schemas.openxmlformats.org/drawingml/2006/main" xmlns:r="http://schemas.openxmlformats.org/officeDocument/2006/relationships" xmlns:p="http://schemas.openxmlformats.org/presentationml/2006/main">
+  <p:cSld>
+    <p:spTree>
+      <p:nvGrpSpPr>
+        <p:cNvPr id="1" name=""/>
+        <p:cNvGrpSpPr/>
+        <p:nvPr/>
+      </p:nvGrpSpPr>
+      <p:grpSpPr>
+        <a:xfrm>
+          <a:off x="0" y="0"/>
+          <a:ext cx="0" cy="0"/>
+          <a:chOff x="0" y="0"/>
+          <a:chExt cx="0" cy="0"/>
+        </a:xfrm>
+      </p:grpSpPr>
+      <p:sp>
+        <p:nvSpPr>
+          <p:cNvPr id="2" name="Title 1">
+            <a:extLst>
+              <a:ext uri="{FF2B5EF4-FFF2-40B4-BE49-F238E27FC236}">
+                <a16:creationId xmlns:a16="http://schemas.microsoft.com/office/drawing/2014/main" id="{E21C0E07-0A5C-4452-A1E0-6388BB1502E2}"/>
+              </a:ext>
+            </a:extLst>
+          </p:cNvPr>
+          <p:cNvSpPr>
+            <a:spLocks noGrp="1"/>
+          </p:cNvSpPr>
+          <p:nvPr>
+            <p:ph type="title"/>
+          </p:nvPr>
+        </p:nvSpPr>
+        <p:spPr/>
+        <p:txBody>
+          <a:bodyPr/>
+          <a:lstStyle/>
+          <a:p>
+            <a:r>
+              <a:rPr lang="en-US" dirty="0"/>
+              <a:t>Difference </a:t>
+            </a:r>
+          </a:p>
+        </p:txBody>
+      </p:sp>
+      <p:pic>
+        <p:nvPicPr>
+          <p:cNvPr id="5" name="Content Placeholder 4" descr="Diagram&#10;&#10;Description automatically generated">
+            <a:extLst>
+              <a:ext uri="{FF2B5EF4-FFF2-40B4-BE49-F238E27FC236}">
+                <a16:creationId xmlns:a16="http://schemas.microsoft.com/office/drawing/2014/main" id="{E040DDEF-6E21-4A2C-AF8E-9CA0025BBE7F}"/>
+              </a:ext>
+            </a:extLst>
+          </p:cNvPr>
+          <p:cNvPicPr>
+            <a:picLocks noGrp="1" noChangeAspect="1"/>
+          </p:cNvPicPr>
+          <p:nvPr>
+            <p:ph idx="1"/>
+          </p:nvPr>
+        </p:nvPicPr>
+        <p:blipFill>
+          <a:blip r:embed="rId2">
+            <a:extLst>
+              <a:ext uri="{28A0092B-C50C-407E-A947-70E740481C1C}">
+                <a14:useLocalDpi xmlns:a14="http://schemas.microsoft.com/office/drawing/2010/main" val="0"/>
+              </a:ext>
+            </a:extLst>
+          </a:blip>
+          <a:stretch>
+            <a:fillRect/>
+          </a:stretch>
+        </p:blipFill>
+        <p:spPr>
+          <a:xfrm>
+            <a:off x="1714500" y="2544763"/>
+            <a:ext cx="5715000" cy="3733800"/>
+          </a:xfrm>
+        </p:spPr>
+      </p:pic>
+    </p:spTree>
+    <p:extLst>
+      <p:ext uri="{BB962C8B-B14F-4D97-AF65-F5344CB8AC3E}">
+        <p14:creationId xmlns:p14="http://schemas.microsoft.com/office/powerpoint/2010/main" val="1390328164"/>
+      </p:ext>
+    </p:extLst>
+  </p:cSld>
+  <p:clrMapOvr>
+    <a:masterClrMapping/>
+  </p:clrMapOvr>
+</p:sld>
+</file>
+
+<file path=ppt/slides/slide9.xml><?xml version="1.0" encoding="utf-8"?>
+<p:sld xmlns:a="http://schemas.openxmlformats.org/drawingml/2006/main" xmlns:r="http://schemas.openxmlformats.org/officeDocument/2006/relationships" xmlns:p="http://schemas.openxmlformats.org/presentationml/2006/main">
+  <p:cSld>
+    <p:spTree>
+      <p:nvGrpSpPr>
+        <p:cNvPr id="1" name=""/>
+        <p:cNvGrpSpPr/>
+        <p:nvPr/>
+      </p:nvGrpSpPr>
+      <p:grpSpPr>
+        <a:xfrm>
+          <a:off x="0" y="0"/>
+          <a:ext cx="0" cy="0"/>
+          <a:chOff x="0" y="0"/>
+          <a:chExt cx="0" cy="0"/>
+        </a:xfrm>
+      </p:grpSpPr>
+      <p:sp>
+        <p:nvSpPr>
+          <p:cNvPr id="2" name="Title 1">
+            <a:extLst>
+              <a:ext uri="{FF2B5EF4-FFF2-40B4-BE49-F238E27FC236}">
+                <a16:creationId xmlns:a16="http://schemas.microsoft.com/office/drawing/2014/main" id="{64B50653-4755-4AF5-95E7-E0D4531F14F9}"/>
+              </a:ext>
+            </a:extLst>
+          </p:cNvPr>
+          <p:cNvSpPr>
+            <a:spLocks noGrp="1"/>
+          </p:cNvSpPr>
+          <p:nvPr>
+            <p:ph type="title"/>
+          </p:nvPr>
+        </p:nvSpPr>
+        <p:spPr/>
+        <p:txBody>
+          <a:bodyPr/>
+          <a:lstStyle/>
+          <a:p>
+            <a:endParaRPr lang="en-US"/>
+          </a:p>
+        </p:txBody>
+      </p:sp>
+      <p:pic>
+        <p:nvPicPr>
+          <p:cNvPr id="5" name="Content Placeholder 4" descr="Table, Excel&#10;&#10;Description automatically generated">
+            <a:extLst>
+              <a:ext uri="{FF2B5EF4-FFF2-40B4-BE49-F238E27FC236}">
+                <a16:creationId xmlns:a16="http://schemas.microsoft.com/office/drawing/2014/main" id="{F03A799F-B9F4-4E62-8D96-ED8F25A8A079}"/>
+              </a:ext>
+            </a:extLst>
+          </p:cNvPr>
+          <p:cNvPicPr>
+            <a:picLocks noGrp="1" noChangeAspect="1"/>
+          </p:cNvPicPr>
+          <p:nvPr>
+            <p:ph idx="1"/>
+          </p:nvPr>
+        </p:nvPicPr>
+        <p:blipFill>
+          <a:blip r:embed="rId2">
+            <a:extLst>
+              <a:ext uri="{28A0092B-C50C-407E-A947-70E740481C1C}">
+                <a14:useLocalDpi xmlns:a14="http://schemas.microsoft.com/office/drawing/2010/main" val="0"/>
+              </a:ext>
+            </a:extLst>
+          </a:blip>
+          <a:stretch>
+            <a:fillRect/>
+          </a:stretch>
+        </p:blipFill>
+        <p:spPr>
+          <a:xfrm>
+            <a:off x="-254995" y="266700"/>
+            <a:ext cx="9653989" cy="6324600"/>
+          </a:xfrm>
+        </p:spPr>
+      </p:pic>
+    </p:spTree>
+    <p:extLst>
+      <p:ext uri="{BB962C8B-B14F-4D97-AF65-F5344CB8AC3E}">
+        <p14:creationId xmlns:p14="http://schemas.microsoft.com/office/powerpoint/2010/main" val="1649804594"/>
+      </p:ext>
+    </p:extLst>
   </p:cSld>
   <p:clrMapOvr>
     <a:masterClrMapping/>

</xml_diff>